<commit_message>
Leonardo architecture diagram updated
</commit_message>
<xml_diff>
--- a/Report/presentation_2.pptx
+++ b/Report/presentation_2.pptx
@@ -12398,41 +12398,6 @@
           </a:p>
         </p:txBody>
       </p:sp>
-      <p:pic>
-        <p:nvPicPr>
-          <p:cNvPr id="6" name="Marcador de Posição de Conteúdo 5">
-            <a:extLst>
-              <a:ext uri="{FF2B5EF4-FFF2-40B4-BE49-F238E27FC236}">
-                <a16:creationId xmlns:a16="http://schemas.microsoft.com/office/drawing/2014/main" id="{3BBD17AD-75BF-44D0-AB26-1F4E27D0F5A9}"/>
-              </a:ext>
-            </a:extLst>
-          </p:cNvPr>
-          <p:cNvPicPr>
-            <a:picLocks noGrp="1" noChangeAspect="1"/>
-          </p:cNvPicPr>
-          <p:nvPr>
-            <p:ph idx="1"/>
-          </p:nvPr>
-        </p:nvPicPr>
-        <p:blipFill>
-          <a:blip r:embed="rId2">
-            <a:extLst>
-              <a:ext uri="{28A0092B-C50C-407E-A947-70E740481C1C}">
-                <a14:useLocalDpi xmlns:a14="http://schemas.microsoft.com/office/drawing/2010/main" val="0"/>
-              </a:ext>
-            </a:extLst>
-          </a:blip>
-          <a:stretch>
-            <a:fillRect/>
-          </a:stretch>
-        </p:blipFill>
-        <p:spPr>
-          <a:xfrm>
-            <a:off x="5471735" y="594359"/>
-            <a:ext cx="4669568" cy="5362707"/>
-          </a:xfrm>
-        </p:spPr>
-      </p:pic>
       <p:sp>
         <p:nvSpPr>
           <p:cNvPr id="4" name="Marcador de Posição do Texto 3">
@@ -12509,6 +12474,41 @@
           </a:p>
         </p:txBody>
       </p:sp>
+      <p:pic>
+        <p:nvPicPr>
+          <p:cNvPr id="12" name="Marcador de Posição de Conteúdo 11">
+            <a:extLst>
+              <a:ext uri="{FF2B5EF4-FFF2-40B4-BE49-F238E27FC236}">
+                <a16:creationId xmlns:a16="http://schemas.microsoft.com/office/drawing/2014/main" id="{F8809156-4AC9-4F2D-975F-C6112A3CBE11}"/>
+              </a:ext>
+            </a:extLst>
+          </p:cNvPr>
+          <p:cNvPicPr>
+            <a:picLocks noGrp="1" noChangeAspect="1"/>
+          </p:cNvPicPr>
+          <p:nvPr>
+            <p:ph idx="1"/>
+          </p:nvPr>
+        </p:nvPicPr>
+        <p:blipFill>
+          <a:blip r:embed="rId2">
+            <a:extLst>
+              <a:ext uri="{28A0092B-C50C-407E-A947-70E740481C1C}">
+                <a14:useLocalDpi xmlns:a14="http://schemas.microsoft.com/office/drawing/2010/main" val="0"/>
+              </a:ext>
+            </a:extLst>
+          </a:blip>
+          <a:stretch>
+            <a:fillRect/>
+          </a:stretch>
+        </p:blipFill>
+        <p:spPr>
+          <a:xfrm>
+            <a:off x="5433376" y="432663"/>
+            <a:ext cx="5486365" cy="5872541"/>
+          </a:xfrm>
+        </p:spPr>
+      </p:pic>
     </p:spTree>
     <p:extLst>
       <p:ext uri="{BB962C8B-B14F-4D97-AF65-F5344CB8AC3E}">

</xml_diff>

<commit_message>
Final presentation image update
</commit_message>
<xml_diff>
--- a/Report/presentation_2.pptx
+++ b/Report/presentation_2.pptx
@@ -612,8 +612,22 @@
           <a:lstStyle/>
           <a:p>
             <a:r>
+              <a:rPr lang="pt-PT" dirty="0" err="1"/>
+              <a:t>Pyknow</a:t>
+            </a:r>
+            <a:r>
               <a:rPr lang="pt-PT" dirty="0"/>
-              <a:t>Explicar por alto cada coleção</a:t>
+              <a:t> para geração de regras</a:t>
+            </a:r>
+          </a:p>
+          <a:p>
+            <a:r>
+              <a:rPr lang="pt-PT" dirty="0" err="1"/>
+              <a:t>Pymongo</a:t>
+            </a:r>
+            <a:r>
+              <a:rPr lang="pt-PT" dirty="0"/>
+              <a:t> para conexão BD</a:t>
             </a:r>
           </a:p>
         </p:txBody>
@@ -635,7 +649,7 @@
           <a:p>
             <a:fld id="{F9C76EEC-3DB8-4814-A8C5-185DA6C5A9E9}" type="slidenum">
               <a:rPr lang="pt-PT" smtClean="0"/>
-              <a:t>11</a:t>
+              <a:t>10</a:t>
             </a:fld>
             <a:endParaRPr lang="pt-PT"/>
           </a:p>
@@ -644,7 +658,7 @@
     </p:spTree>
     <p:extLst>
       <p:ext uri="{BB962C8B-B14F-4D97-AF65-F5344CB8AC3E}">
-        <p14:creationId xmlns:p14="http://schemas.microsoft.com/office/powerpoint/2010/main" val="2839916676"/>
+        <p14:creationId xmlns:p14="http://schemas.microsoft.com/office/powerpoint/2010/main" val="1631278"/>
       </p:ext>
     </p:extLst>
   </p:cSld>
@@ -700,7 +714,7 @@
           <a:p>
             <a:r>
               <a:rPr lang="pt-PT" dirty="0"/>
-              <a:t>Aluno que já não visita o sistema há mais de uma semana</a:t>
+              <a:t>Explicar por alto cada coleção</a:t>
             </a:r>
           </a:p>
         </p:txBody>
@@ -722,7 +736,7 @@
           <a:p>
             <a:fld id="{F9C76EEC-3DB8-4814-A8C5-185DA6C5A9E9}" type="slidenum">
               <a:rPr lang="pt-PT" smtClean="0"/>
-              <a:t>14</a:t>
+              <a:t>11</a:t>
             </a:fld>
             <a:endParaRPr lang="pt-PT"/>
           </a:p>
@@ -731,7 +745,7 @@
     </p:spTree>
     <p:extLst>
       <p:ext uri="{BB962C8B-B14F-4D97-AF65-F5344CB8AC3E}">
-        <p14:creationId xmlns:p14="http://schemas.microsoft.com/office/powerpoint/2010/main" val="3135787992"/>
+        <p14:creationId xmlns:p14="http://schemas.microsoft.com/office/powerpoint/2010/main" val="2839916676"/>
       </p:ext>
     </p:extLst>
   </p:cSld>
@@ -785,6 +799,93 @@
           <a:bodyPr/>
           <a:lstStyle/>
           <a:p>
+            <a:r>
+              <a:rPr lang="pt-PT" dirty="0"/>
+              <a:t>Aluno que já não visita o sistema há mais de uma semana</a:t>
+            </a:r>
+          </a:p>
+        </p:txBody>
+      </p:sp>
+      <p:sp>
+        <p:nvSpPr>
+          <p:cNvPr id="4" name="Marcador de Posição do Número do Diapositivo 3"/>
+          <p:cNvSpPr>
+            <a:spLocks noGrp="1"/>
+          </p:cNvSpPr>
+          <p:nvPr>
+            <p:ph type="sldNum" sz="quarter" idx="5"/>
+          </p:nvPr>
+        </p:nvSpPr>
+        <p:spPr/>
+        <p:txBody>
+          <a:bodyPr/>
+          <a:lstStyle/>
+          <a:p>
+            <a:fld id="{F9C76EEC-3DB8-4814-A8C5-185DA6C5A9E9}" type="slidenum">
+              <a:rPr lang="pt-PT" smtClean="0"/>
+              <a:t>14</a:t>
+            </a:fld>
+            <a:endParaRPr lang="pt-PT"/>
+          </a:p>
+        </p:txBody>
+      </p:sp>
+    </p:spTree>
+    <p:extLst>
+      <p:ext uri="{BB962C8B-B14F-4D97-AF65-F5344CB8AC3E}">
+        <p14:creationId xmlns:p14="http://schemas.microsoft.com/office/powerpoint/2010/main" val="3135787992"/>
+      </p:ext>
+    </p:extLst>
+  </p:cSld>
+  <p:clrMapOvr>
+    <a:masterClrMapping/>
+  </p:clrMapOvr>
+</p:notes>
+</file>
+
+<file path=ppt/notesSlides/notesSlide13.xml><?xml version="1.0" encoding="utf-8"?>
+<p:notes xmlns:a="http://schemas.openxmlformats.org/drawingml/2006/main" xmlns:r="http://schemas.openxmlformats.org/officeDocument/2006/relationships" xmlns:p="http://schemas.openxmlformats.org/presentationml/2006/main">
+  <p:cSld>
+    <p:spTree>
+      <p:nvGrpSpPr>
+        <p:cNvPr id="1" name=""/>
+        <p:cNvGrpSpPr/>
+        <p:nvPr/>
+      </p:nvGrpSpPr>
+      <p:grpSpPr>
+        <a:xfrm>
+          <a:off x="0" y="0"/>
+          <a:ext cx="0" cy="0"/>
+          <a:chOff x="0" y="0"/>
+          <a:chExt cx="0" cy="0"/>
+        </a:xfrm>
+      </p:grpSpPr>
+      <p:sp>
+        <p:nvSpPr>
+          <p:cNvPr id="2" name="Marcador de Posição da Imagem do Diapositivo 1"/>
+          <p:cNvSpPr>
+            <a:spLocks noGrp="1" noRot="1" noChangeAspect="1"/>
+          </p:cNvSpPr>
+          <p:nvPr>
+            <p:ph type="sldImg"/>
+          </p:nvPr>
+        </p:nvSpPr>
+        <p:spPr/>
+      </p:sp>
+      <p:sp>
+        <p:nvSpPr>
+          <p:cNvPr id="3" name="Marcador de Posição de Notas 2"/>
+          <p:cNvSpPr>
+            <a:spLocks noGrp="1"/>
+          </p:cNvSpPr>
+          <p:nvPr>
+            <p:ph type="body" idx="1"/>
+          </p:nvPr>
+        </p:nvSpPr>
+        <p:spPr/>
+        <p:txBody>
+          <a:bodyPr/>
+          <a:lstStyle/>
+          <a:p>
             <a:endParaRPr lang="pt-PT" dirty="0"/>
           </a:p>
         </p:txBody>
@@ -825,7 +926,7 @@
 </p:notes>
 </file>
 
-<file path=ppt/notesSlides/notesSlide13.xml><?xml version="1.0" encoding="utf-8"?>
+<file path=ppt/notesSlides/notesSlide14.xml><?xml version="1.0" encoding="utf-8"?>
 <p:notes xmlns:a="http://schemas.openxmlformats.org/drawingml/2006/main" xmlns:r="http://schemas.openxmlformats.org/officeDocument/2006/relationships" xmlns:p="http://schemas.openxmlformats.org/presentationml/2006/main">
   <p:cSld>
     <p:spTree>
@@ -1289,128 +1390,42 @@
           <a:bodyPr/>
           <a:lstStyle/>
           <a:p>
-            <a:pPr marL="0" marR="0" lvl="0" indent="0" algn="l" defTabSz="914400" rtl="0" eaLnBrk="1" fontAlgn="auto" latinLnBrk="0" hangingPunct="1">
-              <a:lnSpc>
-                <a:spcPct val="100000"/>
-              </a:lnSpc>
-              <a:spcBef>
-                <a:spcPts val="0"/>
-              </a:spcBef>
-              <a:spcAft>
-                <a:spcPts val="0"/>
-              </a:spcAft>
-              <a:buClrTx/>
-              <a:buSzTx/>
-              <a:buFontTx/>
-              <a:buNone/>
-              <a:tabLst/>
-              <a:defRPr/>
-            </a:pPr>
+            <a:r>
+              <a:rPr lang="pt-PT" dirty="0" err="1"/>
+              <a:t>Profiler</a:t>
+            </a:r>
             <a:r>
               <a:rPr lang="pt-PT" dirty="0"/>
-              <a:t>&gt;&gt; apresentação geral das funcionalidades do componente.</a:t>
-            </a:r>
-          </a:p>
-          <a:p>
-            <a:pPr marL="0" marR="0" lvl="0" indent="0" algn="l" defTabSz="914400" rtl="0" eaLnBrk="1" fontAlgn="auto" latinLnBrk="0" hangingPunct="1">
-              <a:lnSpc>
-                <a:spcPct val="100000"/>
-              </a:lnSpc>
-              <a:spcBef>
-                <a:spcPts val="0"/>
-              </a:spcBef>
-              <a:spcAft>
-                <a:spcPts val="0"/>
-              </a:spcAft>
-              <a:buClrTx/>
-              <a:buSzTx/>
-              <a:buFontTx/>
-              <a:buNone/>
-              <a:tabLst/>
-              <a:defRPr/>
-            </a:pPr>
-            <a:endParaRPr lang="pt-PT" dirty="0"/>
-          </a:p>
-          <a:p>
-            <a:pPr marL="0" marR="0" lvl="0" indent="0" algn="l" defTabSz="914400" rtl="0" eaLnBrk="1" fontAlgn="auto" latinLnBrk="0" hangingPunct="1">
-              <a:lnSpc>
-                <a:spcPct val="100000"/>
-              </a:lnSpc>
-              <a:spcBef>
-                <a:spcPts val="0"/>
-              </a:spcBef>
-              <a:spcAft>
-                <a:spcPts val="0"/>
-              </a:spcAft>
-              <a:buClrTx/>
-              <a:buSzTx/>
-              <a:buFontTx/>
-              <a:buNone/>
-              <a:tabLst/>
-              <a:defRPr/>
-            </a:pPr>
+              <a:t>: componente que gere toda a informação dos utilizadores do sistema</a:t>
+            </a:r>
+          </a:p>
+          <a:p>
+            <a:r>
+              <a:rPr lang="pt-PT" dirty="0" err="1"/>
+              <a:t>Reasoner</a:t>
+            </a:r>
             <a:r>
               <a:rPr lang="pt-PT" dirty="0"/>
-              <a:t>	COMPONENTE  NOSSA --- ESTÁ INTEGRADA NOUTRAS  como BD &amp; PROFILER</a:t>
-            </a:r>
-            <a:br>
+              <a:t>: responsável por calcular todas as métricas de avaliação de um utilizador quando este faz um teste, como o seu desempenho e destreza</a:t>
+            </a:r>
+          </a:p>
+          <a:p>
+            <a:r>
               <a:rPr lang="pt-PT" dirty="0"/>
-            </a:br>
+              <a:t>Gestor de diálogos: gere o dialogo entre o sistema e o utilizador</a:t>
+            </a:r>
+          </a:p>
+          <a:p>
             <a:r>
               <a:rPr lang="pt-PT" dirty="0"/>
-              <a:t>Ponto 1.1 – dizer que vem do </a:t>
-            </a:r>
-            <a:r>
-              <a:rPr lang="pt-PT" dirty="0" err="1"/>
-              <a:t>profiler</a:t>
-            </a:r>
+              <a:t>Manager: Toda a comunicação entre os componentes do sistema é feita através de mensagens em formato JSON. O manager gere tanto a comunicação entre eles como entre o sistema e o utilizador</a:t>
+            </a:r>
+          </a:p>
+          <a:p>
             <a:r>
               <a:rPr lang="pt-PT" dirty="0"/>
-              <a:t> (PADRAO em JSON / VETOR DE INFO) –convertemos os valores do padrão noutros valores, segundo os intervalos estabelecidos por</a:t>
-            </a:r>
-            <a:br>
-              <a:rPr lang="pt-PT" dirty="0"/>
-            </a:br>
-            <a:r>
-              <a:rPr lang="pt-PT" dirty="0"/>
-              <a:t>                   nós.</a:t>
-            </a:r>
-          </a:p>
-          <a:p>
-            <a:r>
-              <a:rPr lang="pt-PT" dirty="0"/>
-              <a:t>                –  definir “informação útil” (dados do aluno como performance, se acertou ou errou ultima pergunta,…)</a:t>
-            </a:r>
-          </a:p>
-          <a:p>
-            <a:endParaRPr lang="pt-PT" dirty="0"/>
-          </a:p>
-          <a:p>
-            <a:r>
-              <a:rPr lang="pt-PT" dirty="0"/>
-              <a:t>Ponto 1.2 – explicar que analisamos esses valores e testamos contra as regras estabelecidas por nós, respetivas a cada um dos </a:t>
-            </a:r>
-            <a:r>
-              <a:rPr lang="pt-PT" dirty="0" err="1"/>
-              <a:t>dominios</a:t>
-            </a:r>
-            <a:r>
-              <a:rPr lang="pt-PT" dirty="0"/>
-              <a:t>.</a:t>
-            </a:r>
-          </a:p>
-          <a:p>
-            <a:endParaRPr lang="pt-PT" dirty="0"/>
-          </a:p>
-          <a:p>
-            <a:r>
-              <a:rPr lang="pt-PT" dirty="0"/>
-              <a:t>Ponto 1.3 – dizer que a regra acionada (cujas condições são satisfeitas pelos valores) vai ditar qual o tipo de frase a apresentar ao utilizador</a:t>
-            </a:r>
-            <a:br>
-              <a:rPr lang="pt-PT" dirty="0"/>
-            </a:br>
-            <a:endParaRPr lang="pt-PT" dirty="0"/>
+              <a:t>Todos os componentes mencionados têm acesso a coleções em bases de dados Mongo, de forma a armazenar e obter os dados necessários para o funcionamento do sistema</a:t>
+            </a:r>
           </a:p>
         </p:txBody>
       </p:sp>
@@ -1431,7 +1446,7 @@
           <a:p>
             <a:fld id="{F9C76EEC-3DB8-4814-A8C5-185DA6C5A9E9}" type="slidenum">
               <a:rPr lang="pt-PT" smtClean="0"/>
-              <a:t>7</a:t>
+              <a:t>6</a:t>
             </a:fld>
             <a:endParaRPr lang="pt-PT"/>
           </a:p>
@@ -1440,7 +1455,7 @@
     </p:spTree>
     <p:extLst>
       <p:ext uri="{BB962C8B-B14F-4D97-AF65-F5344CB8AC3E}">
-        <p14:creationId xmlns:p14="http://schemas.microsoft.com/office/powerpoint/2010/main" val="1112323880"/>
+        <p14:creationId xmlns:p14="http://schemas.microsoft.com/office/powerpoint/2010/main" val="371599106"/>
       </p:ext>
     </p:extLst>
   </p:cSld>
@@ -1494,128 +1509,296 @@
           <a:bodyPr/>
           <a:lstStyle/>
           <a:p>
+            <a:pPr marL="0" marR="0" lvl="0" indent="0" algn="l" defTabSz="914400" rtl="0" eaLnBrk="1" fontAlgn="auto" latinLnBrk="0" hangingPunct="1">
+              <a:lnSpc>
+                <a:spcPct val="100000"/>
+              </a:lnSpc>
+              <a:spcBef>
+                <a:spcPts val="0"/>
+              </a:spcBef>
+              <a:spcAft>
+                <a:spcPts val="0"/>
+              </a:spcAft>
+              <a:buClrTx/>
+              <a:buSzTx/>
+              <a:buFontTx/>
+              <a:buNone/>
+              <a:tabLst/>
+              <a:defRPr/>
+            </a:pPr>
             <a:r>
               <a:rPr lang="pt-PT" dirty="0"/>
-              <a:t>DIANA</a:t>
-            </a:r>
-          </a:p>
-          <a:p>
+              <a:t>Analise de padrão-&gt; </a:t>
+            </a:r>
+            <a:r>
+              <a:rPr lang="pt-PT" dirty="0" err="1"/>
+              <a:t>profiler</a:t>
+            </a:r>
+            <a:r>
+              <a:rPr lang="pt-PT" dirty="0"/>
+              <a:t>/manager envia </a:t>
+            </a:r>
+            <a:r>
+              <a:rPr lang="pt-PT" dirty="0" err="1"/>
+              <a:t>padrao</a:t>
+            </a:r>
+            <a:r>
+              <a:rPr lang="pt-PT" dirty="0"/>
+              <a:t> em JSON, nós extraímos e convertemos os seus valores em </a:t>
+            </a:r>
+            <a:r>
+              <a:rPr lang="pt-PT" dirty="0" err="1"/>
+              <a:t>info</a:t>
+            </a:r>
+            <a:r>
+              <a:rPr lang="pt-PT" dirty="0"/>
+              <a:t> útil</a:t>
+            </a:r>
+          </a:p>
+          <a:p>
+            <a:pPr marL="0" marR="0" lvl="0" indent="0" algn="l" defTabSz="914400" rtl="0" eaLnBrk="1" fontAlgn="auto" latinLnBrk="0" hangingPunct="1">
+              <a:lnSpc>
+                <a:spcPct val="100000"/>
+              </a:lnSpc>
+              <a:spcBef>
+                <a:spcPts val="0"/>
+              </a:spcBef>
+              <a:spcAft>
+                <a:spcPts val="0"/>
+              </a:spcAft>
+              <a:buClrTx/>
+              <a:buSzTx/>
+              <a:buFontTx/>
+              <a:buNone/>
+              <a:tabLst/>
+              <a:defRPr/>
+            </a:pPr>
+            <a:r>
+              <a:rPr lang="pt-PT" dirty="0"/>
+              <a:t>Motor de regras-&gt; processamos essa </a:t>
+            </a:r>
+            <a:r>
+              <a:rPr lang="pt-PT" dirty="0" err="1"/>
+              <a:t>info</a:t>
+            </a:r>
+            <a:r>
+              <a:rPr lang="pt-PT" dirty="0"/>
+              <a:t> num motor de regras. Este motor de regras consiste num conjunto de pares de condição-ação. As </a:t>
+            </a:r>
+            <a:r>
+              <a:rPr lang="pt-PT" dirty="0" err="1"/>
+              <a:t>codiçoes</a:t>
+            </a:r>
+            <a:r>
+              <a:rPr lang="pt-PT" dirty="0"/>
+              <a:t> que forem satisfeitas pela informação recolhida faz com que uma regra seja disparada e uma ação seja executada (gerado um dialogo)</a:t>
+            </a:r>
+          </a:p>
+          <a:p>
+            <a:pPr marL="0" marR="0" lvl="0" indent="0" algn="l" defTabSz="914400" rtl="0" eaLnBrk="1" fontAlgn="auto" latinLnBrk="0" hangingPunct="1">
+              <a:lnSpc>
+                <a:spcPct val="100000"/>
+              </a:lnSpc>
+              <a:spcBef>
+                <a:spcPts val="0"/>
+              </a:spcBef>
+              <a:spcAft>
+                <a:spcPts val="0"/>
+              </a:spcAft>
+              <a:buClrTx/>
+              <a:buSzTx/>
+              <a:buFontTx/>
+              <a:buNone/>
+              <a:tabLst/>
+              <a:defRPr/>
+            </a:pPr>
+            <a:r>
+              <a:rPr lang="pt-PT" dirty="0"/>
+              <a:t>Seleção do dialogo -&gt; o dialogo é gerado automaticamente e dinamicamente nesse mesmo momento</a:t>
+            </a:r>
+          </a:p>
+          <a:p>
+            <a:pPr marL="0" marR="0" lvl="0" indent="0" algn="l" defTabSz="914400" rtl="0" eaLnBrk="1" fontAlgn="auto" latinLnBrk="0" hangingPunct="1">
+              <a:lnSpc>
+                <a:spcPct val="100000"/>
+              </a:lnSpc>
+              <a:spcBef>
+                <a:spcPts val="0"/>
+              </a:spcBef>
+              <a:spcAft>
+                <a:spcPts val="0"/>
+              </a:spcAft>
+              <a:buClrTx/>
+              <a:buSzTx/>
+              <a:buFontTx/>
+              <a:buNone/>
+              <a:tabLst/>
+              <a:defRPr/>
+            </a:pPr>
             <a:endParaRPr lang="pt-PT" dirty="0"/>
           </a:p>
           <a:p>
+            <a:pPr marL="0" marR="0" lvl="0" indent="0" algn="l" defTabSz="914400" rtl="0" eaLnBrk="1" fontAlgn="auto" latinLnBrk="0" hangingPunct="1">
+              <a:lnSpc>
+                <a:spcPct val="100000"/>
+              </a:lnSpc>
+              <a:spcBef>
+                <a:spcPts val="0"/>
+              </a:spcBef>
+              <a:spcAft>
+                <a:spcPts val="0"/>
+              </a:spcAft>
+              <a:buClrTx/>
+              <a:buSzTx/>
+              <a:buFontTx/>
+              <a:buNone/>
+              <a:tabLst/>
+              <a:defRPr/>
+            </a:pPr>
+            <a:endParaRPr lang="pt-PT" dirty="0"/>
+          </a:p>
+          <a:p>
+            <a:pPr marL="0" marR="0" lvl="0" indent="0" algn="l" defTabSz="914400" rtl="0" eaLnBrk="1" fontAlgn="auto" latinLnBrk="0" hangingPunct="1">
+              <a:lnSpc>
+                <a:spcPct val="100000"/>
+              </a:lnSpc>
+              <a:spcBef>
+                <a:spcPts val="0"/>
+              </a:spcBef>
+              <a:spcAft>
+                <a:spcPts val="0"/>
+              </a:spcAft>
+              <a:buClrTx/>
+              <a:buSzTx/>
+              <a:buFontTx/>
+              <a:buNone/>
+              <a:tabLst/>
+              <a:defRPr/>
+            </a:pPr>
+            <a:endParaRPr lang="pt-PT" dirty="0"/>
+          </a:p>
+          <a:p>
+            <a:pPr marL="0" marR="0" lvl="0" indent="0" algn="l" defTabSz="914400" rtl="0" eaLnBrk="1" fontAlgn="auto" latinLnBrk="0" hangingPunct="1">
+              <a:lnSpc>
+                <a:spcPct val="100000"/>
+              </a:lnSpc>
+              <a:spcBef>
+                <a:spcPts val="0"/>
+              </a:spcBef>
+              <a:spcAft>
+                <a:spcPts val="0"/>
+              </a:spcAft>
+              <a:buClrTx/>
+              <a:buSzTx/>
+              <a:buFontTx/>
+              <a:buNone/>
+              <a:tabLst/>
+              <a:defRPr/>
+            </a:pPr>
             <a:r>
               <a:rPr lang="pt-PT" dirty="0"/>
-              <a:t>&gt;&gt; </a:t>
+              <a:t>&gt;&gt; apresentação geral das funcionalidades do componente.</a:t>
+            </a:r>
+          </a:p>
+          <a:p>
+            <a:pPr marL="0" marR="0" lvl="0" indent="0" algn="l" defTabSz="914400" rtl="0" eaLnBrk="1" fontAlgn="auto" latinLnBrk="0" hangingPunct="1">
+              <a:lnSpc>
+                <a:spcPct val="100000"/>
+              </a:lnSpc>
+              <a:spcBef>
+                <a:spcPts val="0"/>
+              </a:spcBef>
+              <a:spcAft>
+                <a:spcPts val="0"/>
+              </a:spcAft>
+              <a:buClrTx/>
+              <a:buSzTx/>
+              <a:buFontTx/>
+              <a:buNone/>
+              <a:tabLst/>
+              <a:defRPr/>
+            </a:pPr>
+            <a:endParaRPr lang="pt-PT" dirty="0"/>
+          </a:p>
+          <a:p>
+            <a:pPr marL="0" marR="0" lvl="0" indent="0" algn="l" defTabSz="914400" rtl="0" eaLnBrk="1" fontAlgn="auto" latinLnBrk="0" hangingPunct="1">
+              <a:lnSpc>
+                <a:spcPct val="100000"/>
+              </a:lnSpc>
+              <a:spcBef>
+                <a:spcPts val="0"/>
+              </a:spcBef>
+              <a:spcAft>
+                <a:spcPts val="0"/>
+              </a:spcAft>
+              <a:buClrTx/>
+              <a:buSzTx/>
+              <a:buFontTx/>
+              <a:buNone/>
+              <a:tabLst/>
+              <a:defRPr/>
+            </a:pPr>
+            <a:r>
+              <a:rPr lang="pt-PT" dirty="0"/>
+              <a:t>	COMPONENTE  NOSSA --- ESTÁ INTEGRADA NOUTRAS  como BD &amp; PROFILER</a:t>
+            </a:r>
+            <a:br>
+              <a:rPr lang="pt-PT" dirty="0"/>
+            </a:br>
+            <a:r>
+              <a:rPr lang="pt-PT" dirty="0"/>
+              <a:t>Ponto 1.1 – dizer que vem do </a:t>
             </a:r>
             <a:r>
               <a:rPr lang="pt-PT" dirty="0" err="1"/>
-              <a:t>tipoe</a:t>
+              <a:t>profiler</a:t>
             </a:r>
             <a:r>
               <a:rPr lang="pt-PT" dirty="0"/>
-              <a:t> de frase = nível </a:t>
-            </a:r>
-            <a:r>
-              <a:rPr lang="pt-PT"/>
-              <a:t>de ironia</a:t>
-            </a:r>
+              <a:t> (PADRAO em JSON / VETOR DE INFO) –convertemos os valores do padrão noutros valores, segundo os intervalos estabelecidos por</a:t>
+            </a:r>
+            <a:br>
+              <a:rPr lang="pt-PT" dirty="0"/>
+            </a:br>
+            <a:r>
+              <a:rPr lang="pt-PT" dirty="0"/>
+              <a:t>                   nós.</a:t>
+            </a:r>
+          </a:p>
+          <a:p>
+            <a:r>
+              <a:rPr lang="pt-PT" dirty="0"/>
+              <a:t>                –  definir “informação útil” (dados do aluno como performance, se acertou ou errou ultima pergunta,…)</a:t>
+            </a:r>
+          </a:p>
+          <a:p>
             <a:endParaRPr lang="pt-PT" dirty="0"/>
           </a:p>
           <a:p>
             <a:r>
               <a:rPr lang="pt-PT" dirty="0"/>
-              <a:t>&gt;&gt; apresentação de um pequeno excerto da base de dados das frases e da sua informação de suporte.</a:t>
-            </a:r>
-          </a:p>
-          <a:p>
+              <a:t>Ponto 1.2 – explicar que analisamos esses valores e testamos contra as regras estabelecidas por nós, respetivas a cada um dos </a:t>
+            </a:r>
+            <a:r>
+              <a:rPr lang="pt-PT" dirty="0" err="1"/>
+              <a:t>dominios</a:t>
+            </a:r>
             <a:r>
               <a:rPr lang="pt-PT" dirty="0"/>
-              <a:t>&gt;&gt; exemplo de um diálogo suportado pelo sistema.</a:t>
-            </a:r>
+              <a:t>.</a:t>
+            </a:r>
+          </a:p>
+          <a:p>
+            <a:endParaRPr lang="pt-PT" dirty="0"/>
           </a:p>
           <a:p>
             <a:r>
               <a:rPr lang="pt-PT" dirty="0"/>
-              <a:t>&gt;&gt; explicar </a:t>
-            </a:r>
-            <a:r>
-              <a:rPr lang="pt-PT" dirty="0" err="1"/>
-              <a:t>tags</a:t>
-            </a:r>
-            <a:r>
+              <a:t>Ponto 1.3 – dizer que a regra acionada (cujas condições são satisfeitas pelos valores) vai ditar qual o tipo de frase a apresentar ao utilizador</a:t>
+            </a:r>
+            <a:br>
               <a:rPr lang="pt-PT" dirty="0"/>
-              <a:t> (</a:t>
-            </a:r>
-            <a:r>
-              <a:rPr lang="pt-PT" dirty="0" err="1"/>
-              <a:t>greetings</a:t>
-            </a:r>
-            <a:r>
-              <a:rPr lang="pt-PT" dirty="0"/>
-              <a:t>, </a:t>
-            </a:r>
-            <a:r>
-              <a:rPr lang="pt-PT" dirty="0" err="1"/>
-              <a:t>funny</a:t>
-            </a:r>
-            <a:r>
-              <a:rPr lang="pt-PT" dirty="0"/>
-              <a:t> [ESTADOS ESPIRITO LEONARDO], </a:t>
-            </a:r>
-            <a:r>
-              <a:rPr lang="pt-PT" dirty="0" err="1"/>
-              <a:t>phrase</a:t>
-            </a:r>
-            <a:r>
-              <a:rPr lang="pt-PT" dirty="0"/>
-              <a:t>, </a:t>
-            </a:r>
-            <a:r>
-              <a:rPr lang="pt-PT" dirty="0" err="1"/>
-              <a:t>answer</a:t>
-            </a:r>
-            <a:r>
-              <a:rPr lang="pt-PT" dirty="0"/>
-              <a:t>…)</a:t>
-            </a:r>
-          </a:p>
-          <a:p>
-            <a:r>
-              <a:rPr lang="pt-PT" dirty="0"/>
-              <a:t>&gt;&gt; Temos em conta agora a última vez que o </a:t>
-            </a:r>
-            <a:r>
-              <a:rPr lang="pt-PT" dirty="0" err="1"/>
-              <a:t>user</a:t>
-            </a:r>
-            <a:r>
-              <a:rPr lang="pt-PT" dirty="0"/>
-              <a:t> utilizou o chat, p fazer diálogo de acordo c isso. </a:t>
-            </a:r>
-          </a:p>
-          <a:p>
-            <a:r>
-              <a:rPr lang="pt-PT" dirty="0"/>
-              <a:t>Fizemos um </a:t>
-            </a:r>
-            <a:r>
-              <a:rPr lang="pt-PT" dirty="0" err="1"/>
-              <a:t>historico</a:t>
-            </a:r>
-            <a:r>
-              <a:rPr lang="pt-PT" dirty="0"/>
-              <a:t> de </a:t>
-            </a:r>
-            <a:r>
-              <a:rPr lang="pt-PT" dirty="0" err="1"/>
-              <a:t>user</a:t>
-            </a:r>
-            <a:r>
-              <a:rPr lang="pt-PT" dirty="0"/>
-              <a:t> p guardar isso se bem que depois vamos ter isso dado pelo Manager</a:t>
-            </a:r>
-          </a:p>
-          <a:p>
+            </a:br>
             <a:endParaRPr lang="pt-PT" dirty="0"/>
           </a:p>
         </p:txBody>
@@ -1637,7 +1820,7 @@
           <a:p>
             <a:fld id="{F9C76EEC-3DB8-4814-A8C5-185DA6C5A9E9}" type="slidenum">
               <a:rPr lang="pt-PT" smtClean="0"/>
-              <a:t>8</a:t>
+              <a:t>7</a:t>
             </a:fld>
             <a:endParaRPr lang="pt-PT"/>
           </a:p>
@@ -1646,7 +1829,7 @@
     </p:spTree>
     <p:extLst>
       <p:ext uri="{BB962C8B-B14F-4D97-AF65-F5344CB8AC3E}">
-        <p14:creationId xmlns:p14="http://schemas.microsoft.com/office/powerpoint/2010/main" val="2373765445"/>
+        <p14:creationId xmlns:p14="http://schemas.microsoft.com/office/powerpoint/2010/main" val="1112323880"/>
       </p:ext>
     </p:extLst>
   </p:cSld>
@@ -1700,13 +1883,21 @@
           <a:bodyPr/>
           <a:lstStyle/>
           <a:p>
-            <a:pPr marL="0" indent="0">
-              <a:buFontTx/>
-              <a:buNone/>
-            </a:pPr>
             <a:r>
               <a:rPr lang="pt-PT" dirty="0"/>
-              <a:t>- Temos agora a gerar dinamicamente segundo um </a:t>
+              <a:t>- Geração de frases supervisionadas</a:t>
+            </a:r>
+          </a:p>
+          <a:p>
+            <a:r>
+              <a:rPr lang="pt-PT" dirty="0"/>
+              <a:t>- tipos de frase = nível de ironia = é assim uma das formas que nós damos personalidade ao sistema</a:t>
+            </a:r>
+          </a:p>
+          <a:p>
+            <a:r>
+              <a:rPr lang="pt-PT" dirty="0"/>
+              <a:t>- conjunto de frases para servir como </a:t>
             </a:r>
             <a:r>
               <a:rPr lang="pt-PT" dirty="0" err="1"/>
@@ -1714,296 +1905,122 @@
             </a:r>
             <a:r>
               <a:rPr lang="pt-PT" dirty="0"/>
-              <a:t> inicial guardado em </a:t>
+              <a:t> inicial para a construção de dialogo</a:t>
+            </a:r>
+          </a:p>
+          <a:p>
+            <a:r>
+              <a:rPr lang="pt-PT" dirty="0"/>
+              <a:t>- conjunto de respostas apresentadas como </a:t>
             </a:r>
             <a:r>
               <a:rPr lang="pt-PT" dirty="0" err="1"/>
-              <a:t>mongoDB</a:t>
+              <a:t>opçoes</a:t>
             </a:r>
             <a:r>
               <a:rPr lang="pt-PT" dirty="0"/>
-              <a:t>, se bem que  temos é de popular mais</a:t>
+              <a:t> que o utilizador pode selecionar e assim interagir com o sistema</a:t>
             </a:r>
           </a:p>
           <a:p>
             <a:endParaRPr lang="pt-PT" dirty="0"/>
           </a:p>
           <a:p>
-            <a:pPr marL="171450" indent="-171450">
-              <a:buFontTx/>
-              <a:buChar char="-"/>
-            </a:pPr>
             <a:r>
               <a:rPr lang="pt-PT" dirty="0"/>
-              <a:t>No </a:t>
+              <a:t>&gt;&gt; apresentação de um pequeno excerto da base de dados das frases e da sua informação de suporte.</a:t>
+            </a:r>
+          </a:p>
+          <a:p>
+            <a:r>
+              <a:rPr lang="pt-PT" dirty="0"/>
+              <a:t>&gt;&gt; exemplo de um diálogo suportado pelo sistema.</a:t>
+            </a:r>
+          </a:p>
+          <a:p>
+            <a:r>
+              <a:rPr lang="pt-PT" dirty="0"/>
+              <a:t>&gt;&gt; explicar </a:t>
             </a:r>
             <a:r>
               <a:rPr lang="pt-PT" dirty="0" err="1"/>
-              <a:t>python</a:t>
+              <a:t>tags</a:t>
             </a:r>
             <a:r>
               <a:rPr lang="pt-PT" dirty="0"/>
-              <a:t> falar do script para geração de frases, com cadeias de </a:t>
+              <a:t> (</a:t>
             </a:r>
             <a:r>
               <a:rPr lang="pt-PT" dirty="0" err="1"/>
-              <a:t>Markov</a:t>
+              <a:t>greetings</a:t>
             </a:r>
             <a:r>
               <a:rPr lang="pt-PT" dirty="0"/>
-              <a:t> e utilização de NLTK para processamento de frases (separar por palavras)</a:t>
-            </a:r>
-          </a:p>
-          <a:p>
-            <a:pPr marL="171450" indent="-171450">
-              <a:buFontTx/>
-              <a:buChar char="-"/>
-            </a:pPr>
+              <a:t>, </a:t>
+            </a:r>
+            <a:r>
+              <a:rPr lang="pt-PT" dirty="0" err="1"/>
+              <a:t>funny</a:t>
+            </a:r>
+            <a:r>
+              <a:rPr lang="pt-PT" dirty="0"/>
+              <a:t> [ESTADOS ESPIRITO LEONARDO], </a:t>
+            </a:r>
+            <a:r>
+              <a:rPr lang="pt-PT" dirty="0" err="1"/>
+              <a:t>phrase</a:t>
+            </a:r>
+            <a:r>
+              <a:rPr lang="pt-PT" dirty="0"/>
+              <a:t>, </a:t>
+            </a:r>
+            <a:r>
+              <a:rPr lang="pt-PT" dirty="0" err="1"/>
+              <a:t>answer</a:t>
+            </a:r>
+            <a:r>
+              <a:rPr lang="pt-PT" dirty="0"/>
+              <a:t>…)</a:t>
+            </a:r>
+          </a:p>
+          <a:p>
+            <a:r>
+              <a:rPr lang="pt-PT" dirty="0"/>
+              <a:t>&gt;&gt; Temos em conta agora a última vez que o </a:t>
+            </a:r>
+            <a:r>
+              <a:rPr lang="pt-PT" dirty="0" err="1"/>
+              <a:t>user</a:t>
+            </a:r>
+            <a:r>
+              <a:rPr lang="pt-PT" dirty="0"/>
+              <a:t> utilizou o chat, p fazer diálogo de acordo c isso. </a:t>
+            </a:r>
+          </a:p>
+          <a:p>
+            <a:r>
+              <a:rPr lang="pt-PT" dirty="0"/>
+              <a:t>Fizemos um </a:t>
+            </a:r>
+            <a:r>
+              <a:rPr lang="pt-PT" dirty="0" err="1"/>
+              <a:t>historico</a:t>
+            </a:r>
+            <a:r>
+              <a:rPr lang="pt-PT" dirty="0"/>
+              <a:t> de </a:t>
+            </a:r>
+            <a:r>
+              <a:rPr lang="pt-PT" dirty="0" err="1"/>
+              <a:t>user</a:t>
+            </a:r>
+            <a:r>
+              <a:rPr lang="pt-PT" dirty="0"/>
+              <a:t> p guardar isso se bem que depois vamos ter isso dado pelo Manager</a:t>
+            </a:r>
+          </a:p>
+          <a:p>
             <a:endParaRPr lang="pt-PT" dirty="0"/>
-          </a:p>
-          <a:p>
-            <a:pPr marL="171450" indent="-171450">
-              <a:buFontTx/>
-              <a:buChar char="-"/>
-            </a:pPr>
-            <a:r>
-              <a:rPr lang="pt-PT" dirty="0" err="1"/>
-              <a:t>Sentence</a:t>
-            </a:r>
-            <a:r>
-              <a:rPr lang="pt-PT" dirty="0"/>
-              <a:t> </a:t>
-            </a:r>
-            <a:r>
-              <a:rPr lang="pt-PT" dirty="0" err="1"/>
-              <a:t>generator</a:t>
-            </a:r>
-            <a:r>
-              <a:rPr lang="pt-PT" dirty="0"/>
-              <a:t> </a:t>
-            </a:r>
-            <a:r>
-              <a:rPr lang="pt-PT" dirty="0" err="1"/>
-              <a:t>with</a:t>
-            </a:r>
-            <a:r>
-              <a:rPr lang="pt-PT" dirty="0"/>
-              <a:t> </a:t>
-            </a:r>
-            <a:r>
-              <a:rPr lang="pt-PT" dirty="0" err="1"/>
-              <a:t>Markov</a:t>
-            </a:r>
-            <a:r>
-              <a:rPr lang="pt-PT" dirty="0"/>
-              <a:t> </a:t>
-            </a:r>
-            <a:r>
-              <a:rPr lang="pt-PT" dirty="0" err="1"/>
-              <a:t>chains</a:t>
-            </a:r>
-            <a:r>
-              <a:rPr lang="pt-PT" dirty="0"/>
-              <a:t>: o programa </a:t>
-            </a:r>
-            <a:r>
-              <a:rPr lang="pt-PT" sz="1200" b="0" i="0" kern="1200" dirty="0">
-                <a:solidFill>
-                  <a:schemeClr val="tx1"/>
-                </a:solidFill>
-                <a:effectLst/>
-                <a:latin typeface="+mn-lt"/>
-                <a:ea typeface="+mn-ea"/>
-                <a:cs typeface="+mn-cs"/>
-              </a:rPr>
-              <a:t>cria um dicionário com as palavras, recebidas de um </a:t>
-            </a:r>
-            <a:r>
-              <a:rPr lang="pt-PT" sz="1200" b="0" i="0" kern="1200" dirty="0" err="1">
-                <a:solidFill>
-                  <a:schemeClr val="tx1"/>
-                </a:solidFill>
-                <a:effectLst/>
-                <a:latin typeface="+mn-lt"/>
-                <a:ea typeface="+mn-ea"/>
-                <a:cs typeface="+mn-cs"/>
-              </a:rPr>
-              <a:t>dataset</a:t>
-            </a:r>
-            <a:r>
-              <a:rPr lang="pt-PT" sz="1200" b="0" i="0" kern="1200" dirty="0">
-                <a:solidFill>
-                  <a:schemeClr val="tx1"/>
-                </a:solidFill>
-                <a:effectLst/>
-                <a:latin typeface="+mn-lt"/>
-                <a:ea typeface="+mn-ea"/>
-                <a:cs typeface="+mn-cs"/>
-              </a:rPr>
-              <a:t> com frases, e a palavra que vem a seguir, e depois aplica cadeias de </a:t>
-            </a:r>
-            <a:r>
-              <a:rPr lang="pt-PT" sz="1200" b="0" i="0" kern="1200" dirty="0" err="1">
-                <a:solidFill>
-                  <a:schemeClr val="tx1"/>
-                </a:solidFill>
-                <a:effectLst/>
-                <a:latin typeface="+mn-lt"/>
-                <a:ea typeface="+mn-ea"/>
-                <a:cs typeface="+mn-cs"/>
-              </a:rPr>
-              <a:t>Markov</a:t>
-            </a:r>
-            <a:r>
-              <a:rPr lang="pt-PT" sz="1200" b="0" i="0" kern="1200" dirty="0">
-                <a:solidFill>
-                  <a:schemeClr val="tx1"/>
-                </a:solidFill>
-                <a:effectLst/>
-                <a:latin typeface="+mn-lt"/>
-                <a:ea typeface="+mn-ea"/>
-                <a:cs typeface="+mn-cs"/>
-              </a:rPr>
-              <a:t> sobre essa informação tentando fazer frases que fazem sentido. As cadeias de </a:t>
-            </a:r>
-            <a:r>
-              <a:rPr lang="pt-PT" sz="1200" b="0" i="0" kern="1200" dirty="0" err="1">
-                <a:solidFill>
-                  <a:schemeClr val="tx1"/>
-                </a:solidFill>
-                <a:effectLst/>
-                <a:latin typeface="+mn-lt"/>
-                <a:ea typeface="+mn-ea"/>
-                <a:cs typeface="+mn-cs"/>
-              </a:rPr>
-              <a:t>Markov</a:t>
-            </a:r>
-            <a:r>
-              <a:rPr lang="pt-PT" sz="1200" b="0" i="0" kern="1200" dirty="0">
-                <a:solidFill>
-                  <a:schemeClr val="tx1"/>
-                </a:solidFill>
-                <a:effectLst/>
-                <a:latin typeface="+mn-lt"/>
-                <a:ea typeface="+mn-ea"/>
-                <a:cs typeface="+mn-cs"/>
-              </a:rPr>
-              <a:t> são uteis para prever o estado futuro com base nas características do estado presente. Assim , o programa utiliza e analisa as frases de um </a:t>
-            </a:r>
-            <a:r>
-              <a:rPr lang="pt-PT" sz="1200" b="0" i="0" kern="1200" dirty="0" err="1">
-                <a:solidFill>
-                  <a:schemeClr val="tx1"/>
-                </a:solidFill>
-                <a:effectLst/>
-                <a:latin typeface="+mn-lt"/>
-                <a:ea typeface="+mn-ea"/>
-                <a:cs typeface="+mn-cs"/>
-              </a:rPr>
-              <a:t>dataset</a:t>
-            </a:r>
-            <a:r>
-              <a:rPr lang="pt-PT" sz="1200" b="0" i="0" kern="1200" dirty="0">
-                <a:solidFill>
-                  <a:schemeClr val="tx1"/>
-                </a:solidFill>
-                <a:effectLst/>
-                <a:latin typeface="+mn-lt"/>
-                <a:ea typeface="+mn-ea"/>
-                <a:cs typeface="+mn-cs"/>
-              </a:rPr>
-              <a:t> inicial e, a partir dai, tenta prever e gerar novas frases. Utiliza as cadeiras de </a:t>
-            </a:r>
-            <a:r>
-              <a:rPr lang="pt-PT" sz="1200" b="0" i="0" kern="1200" dirty="0" err="1">
-                <a:solidFill>
-                  <a:schemeClr val="tx1"/>
-                </a:solidFill>
-                <a:effectLst/>
-                <a:latin typeface="+mn-lt"/>
-                <a:ea typeface="+mn-ea"/>
-                <a:cs typeface="+mn-cs"/>
-              </a:rPr>
-              <a:t>markov</a:t>
-            </a:r>
-            <a:r>
-              <a:rPr lang="pt-PT" sz="1200" b="0" i="0" kern="1200" dirty="0">
-                <a:solidFill>
-                  <a:schemeClr val="tx1"/>
-                </a:solidFill>
-                <a:effectLst/>
-                <a:latin typeface="+mn-lt"/>
-                <a:ea typeface="+mn-ea"/>
-                <a:cs typeface="+mn-cs"/>
-              </a:rPr>
-              <a:t> para prever quais as sequências de palavras mais adequadas que precedem a um outro conjunto de palavras.</a:t>
-            </a:r>
-          </a:p>
-          <a:p>
-            <a:pPr marL="171450" indent="-171450">
-              <a:buFontTx/>
-              <a:buChar char="-"/>
-            </a:pPr>
-            <a:r>
-              <a:rPr lang="pt-PT" sz="1200" b="0" i="0" kern="1200" dirty="0">
-                <a:solidFill>
-                  <a:schemeClr val="tx1"/>
-                </a:solidFill>
-                <a:effectLst/>
-                <a:latin typeface="+mn-lt"/>
-                <a:ea typeface="+mn-ea"/>
-                <a:cs typeface="+mn-cs"/>
-              </a:rPr>
-              <a:t>Cadeias de </a:t>
-            </a:r>
-            <a:r>
-              <a:rPr lang="pt-PT" sz="1200" b="0" i="0" kern="1200" dirty="0" err="1">
-                <a:solidFill>
-                  <a:schemeClr val="tx1"/>
-                </a:solidFill>
-                <a:effectLst/>
-                <a:latin typeface="+mn-lt"/>
-                <a:ea typeface="+mn-ea"/>
-                <a:cs typeface="+mn-cs"/>
-              </a:rPr>
-              <a:t>Markov</a:t>
-            </a:r>
-            <a:r>
-              <a:rPr lang="pt-PT" sz="1200" b="0" i="0" kern="1200" dirty="0">
-                <a:solidFill>
-                  <a:schemeClr val="tx1"/>
-                </a:solidFill>
-                <a:effectLst/>
-                <a:latin typeface="+mn-lt"/>
-                <a:ea typeface="+mn-ea"/>
-                <a:cs typeface="+mn-cs"/>
-              </a:rPr>
-              <a:t> são, por isso, bastante utilizadas neste tipo de situações (</a:t>
-            </a:r>
-            <a:r>
-              <a:rPr lang="pt-PT" sz="1200" b="0" i="0" kern="1200" dirty="0" err="1">
-                <a:solidFill>
-                  <a:schemeClr val="tx1"/>
-                </a:solidFill>
-                <a:effectLst/>
-                <a:latin typeface="+mn-lt"/>
-                <a:ea typeface="+mn-ea"/>
-                <a:cs typeface="+mn-cs"/>
-              </a:rPr>
-              <a:t>chatbots</a:t>
-            </a:r>
-            <a:r>
-              <a:rPr lang="pt-PT" sz="1200" b="0" i="0" kern="1200" dirty="0">
-                <a:solidFill>
-                  <a:schemeClr val="tx1"/>
-                </a:solidFill>
-                <a:effectLst/>
-                <a:latin typeface="+mn-lt"/>
-                <a:ea typeface="+mn-ea"/>
-                <a:cs typeface="+mn-cs"/>
-              </a:rPr>
-              <a:t>)!</a:t>
-            </a:r>
           </a:p>
         </p:txBody>
       </p:sp>
@@ -2024,7 +2041,7 @@
           <a:p>
             <a:fld id="{F9C76EEC-3DB8-4814-A8C5-185DA6C5A9E9}" type="slidenum">
               <a:rPr lang="pt-PT" smtClean="0"/>
-              <a:t>9</a:t>
+              <a:t>8</a:t>
             </a:fld>
             <a:endParaRPr lang="pt-PT"/>
           </a:p>
@@ -2033,7 +2050,7 @@
     </p:spTree>
     <p:extLst>
       <p:ext uri="{BB962C8B-B14F-4D97-AF65-F5344CB8AC3E}">
-        <p14:creationId xmlns:p14="http://schemas.microsoft.com/office/powerpoint/2010/main" val="3154484066"/>
+        <p14:creationId xmlns:p14="http://schemas.microsoft.com/office/powerpoint/2010/main" val="2373765445"/>
       </p:ext>
     </p:extLst>
   </p:cSld>
@@ -2087,23 +2104,364 @@
           <a:bodyPr/>
           <a:lstStyle/>
           <a:p>
+            <a:pPr marL="0" indent="0">
+              <a:buFontTx/>
+              <a:buNone/>
+            </a:pPr>
+            <a:r>
+              <a:rPr lang="pt-PT" dirty="0"/>
+              <a:t>Todo este projeto está a ser desenvolvido em </a:t>
+            </a:r>
             <a:r>
               <a:rPr lang="pt-PT" dirty="0" err="1"/>
-              <a:t>Pyknow</a:t>
+              <a:t>python</a:t>
             </a:r>
             <a:r>
               <a:rPr lang="pt-PT" dirty="0"/>
-              <a:t> para geração de regras</a:t>
-            </a:r>
-          </a:p>
-          <a:p>
+              <a:t>.</a:t>
+            </a:r>
+          </a:p>
+          <a:p>
+            <a:pPr marL="0" indent="0">
+              <a:buFontTx/>
+              <a:buNone/>
+            </a:pPr>
+            <a:endParaRPr lang="pt-PT" dirty="0"/>
+          </a:p>
+          <a:p>
+            <a:pPr marL="0" indent="0">
+              <a:buFontTx/>
+              <a:buNone/>
+            </a:pPr>
+            <a:r>
+              <a:rPr lang="pt-PT" dirty="0"/>
+              <a:t>Usamos biblioteca </a:t>
+            </a:r>
             <a:r>
               <a:rPr lang="pt-PT" dirty="0" err="1"/>
-              <a:t>Pymongo</a:t>
+              <a:t>pyknow</a:t>
             </a:r>
             <a:r>
               <a:rPr lang="pt-PT" dirty="0"/>
-              <a:t> para conexão BD</a:t>
+              <a:t> para construir o nosso motor </a:t>
+            </a:r>
+            <a:r>
+              <a:rPr lang="pt-PT"/>
+              <a:t>de regras</a:t>
+            </a:r>
+            <a:endParaRPr lang="pt-PT" dirty="0"/>
+          </a:p>
+          <a:p>
+            <a:pPr marL="0" indent="0">
+              <a:buFontTx/>
+              <a:buNone/>
+            </a:pPr>
+            <a:endParaRPr lang="pt-PT" dirty="0"/>
+          </a:p>
+          <a:p>
+            <a:pPr marL="0" indent="0">
+              <a:buFontTx/>
+              <a:buNone/>
+            </a:pPr>
+            <a:r>
+              <a:rPr lang="pt-PT" dirty="0"/>
+              <a:t>- Temos agora a gerar dinamicamente segundo um </a:t>
+            </a:r>
+            <a:r>
+              <a:rPr lang="pt-PT" dirty="0" err="1"/>
+              <a:t>dataset</a:t>
+            </a:r>
+            <a:r>
+              <a:rPr lang="pt-PT" dirty="0"/>
+              <a:t> inicial guardado em </a:t>
+            </a:r>
+            <a:r>
+              <a:rPr lang="pt-PT" dirty="0" err="1"/>
+              <a:t>mongoDB</a:t>
+            </a:r>
+            <a:r>
+              <a:rPr lang="pt-PT" dirty="0"/>
+              <a:t>, se bem que  temos é de popular mais</a:t>
+            </a:r>
+          </a:p>
+          <a:p>
+            <a:endParaRPr lang="pt-PT" dirty="0"/>
+          </a:p>
+          <a:p>
+            <a:pPr marL="171450" indent="-171450">
+              <a:buFontTx/>
+              <a:buChar char="-"/>
+            </a:pPr>
+            <a:r>
+              <a:rPr lang="pt-PT" dirty="0"/>
+              <a:t>No </a:t>
+            </a:r>
+            <a:r>
+              <a:rPr lang="pt-PT" dirty="0" err="1"/>
+              <a:t>python</a:t>
+            </a:r>
+            <a:r>
+              <a:rPr lang="pt-PT" dirty="0"/>
+              <a:t> falar do script para geração de frases, com cadeias de </a:t>
+            </a:r>
+            <a:r>
+              <a:rPr lang="pt-PT" dirty="0" err="1"/>
+              <a:t>Markov</a:t>
+            </a:r>
+            <a:r>
+              <a:rPr lang="pt-PT" dirty="0"/>
+              <a:t> e utilização do pacote NLTK para processamento de frases de dialogo (separar por palavras)</a:t>
+            </a:r>
+          </a:p>
+          <a:p>
+            <a:pPr marL="171450" indent="-171450">
+              <a:buFontTx/>
+              <a:buChar char="-"/>
+            </a:pPr>
+            <a:endParaRPr lang="pt-PT" dirty="0"/>
+          </a:p>
+          <a:p>
+            <a:pPr marL="171450" indent="-171450">
+              <a:buFontTx/>
+              <a:buChar char="-"/>
+            </a:pPr>
+            <a:r>
+              <a:rPr lang="pt-PT" dirty="0" err="1"/>
+              <a:t>Sentence</a:t>
+            </a:r>
+            <a:r>
+              <a:rPr lang="pt-PT" dirty="0"/>
+              <a:t> </a:t>
+            </a:r>
+            <a:r>
+              <a:rPr lang="pt-PT" dirty="0" err="1"/>
+              <a:t>generator</a:t>
+            </a:r>
+            <a:r>
+              <a:rPr lang="pt-PT" dirty="0"/>
+              <a:t> </a:t>
+            </a:r>
+            <a:r>
+              <a:rPr lang="pt-PT" dirty="0" err="1"/>
+              <a:t>with</a:t>
+            </a:r>
+            <a:r>
+              <a:rPr lang="pt-PT" dirty="0"/>
+              <a:t> </a:t>
+            </a:r>
+            <a:r>
+              <a:rPr lang="pt-PT" dirty="0" err="1"/>
+              <a:t>Markov</a:t>
+            </a:r>
+            <a:r>
+              <a:rPr lang="pt-PT" dirty="0"/>
+              <a:t> </a:t>
+            </a:r>
+            <a:r>
+              <a:rPr lang="pt-PT" dirty="0" err="1"/>
+              <a:t>chains</a:t>
+            </a:r>
+            <a:r>
+              <a:rPr lang="pt-PT" dirty="0"/>
+              <a:t>: o programa </a:t>
+            </a:r>
+            <a:r>
+              <a:rPr lang="pt-PT" sz="1200" b="0" i="0" kern="1200" dirty="0">
+                <a:solidFill>
+                  <a:schemeClr val="tx1"/>
+                </a:solidFill>
+                <a:effectLst/>
+                <a:latin typeface="+mn-lt"/>
+                <a:ea typeface="+mn-ea"/>
+                <a:cs typeface="+mn-cs"/>
+              </a:rPr>
+              <a:t>cria um dicionário com as palavras, recebidas de um </a:t>
+            </a:r>
+            <a:r>
+              <a:rPr lang="pt-PT" sz="1200" b="0" i="0" kern="1200" dirty="0" err="1">
+                <a:solidFill>
+                  <a:schemeClr val="tx1"/>
+                </a:solidFill>
+                <a:effectLst/>
+                <a:latin typeface="+mn-lt"/>
+                <a:ea typeface="+mn-ea"/>
+                <a:cs typeface="+mn-cs"/>
+              </a:rPr>
+              <a:t>dataset</a:t>
+            </a:r>
+            <a:r>
+              <a:rPr lang="pt-PT" sz="1200" b="0" i="0" kern="1200" dirty="0">
+                <a:solidFill>
+                  <a:schemeClr val="tx1"/>
+                </a:solidFill>
+                <a:effectLst/>
+                <a:latin typeface="+mn-lt"/>
+                <a:ea typeface="+mn-ea"/>
+                <a:cs typeface="+mn-cs"/>
+              </a:rPr>
+              <a:t> com frases, e a palavra que vem a seguir, e depois aplica cadeias de </a:t>
+            </a:r>
+            <a:r>
+              <a:rPr lang="pt-PT" sz="1200" b="0" i="0" kern="1200" dirty="0" err="1">
+                <a:solidFill>
+                  <a:schemeClr val="tx1"/>
+                </a:solidFill>
+                <a:effectLst/>
+                <a:latin typeface="+mn-lt"/>
+                <a:ea typeface="+mn-ea"/>
+                <a:cs typeface="+mn-cs"/>
+              </a:rPr>
+              <a:t>Markov</a:t>
+            </a:r>
+            <a:r>
+              <a:rPr lang="pt-PT" sz="1200" b="0" i="0" kern="1200" dirty="0">
+                <a:solidFill>
+                  <a:schemeClr val="tx1"/>
+                </a:solidFill>
+                <a:effectLst/>
+                <a:latin typeface="+mn-lt"/>
+                <a:ea typeface="+mn-ea"/>
+                <a:cs typeface="+mn-cs"/>
+              </a:rPr>
+              <a:t> sobre essa informação tentando fazer frases que fazem sentido. As cadeias de </a:t>
+            </a:r>
+            <a:r>
+              <a:rPr lang="pt-PT" sz="1200" b="0" i="0" kern="1200" dirty="0" err="1">
+                <a:solidFill>
+                  <a:schemeClr val="tx1"/>
+                </a:solidFill>
+                <a:effectLst/>
+                <a:latin typeface="+mn-lt"/>
+                <a:ea typeface="+mn-ea"/>
+                <a:cs typeface="+mn-cs"/>
+              </a:rPr>
+              <a:t>Markov</a:t>
+            </a:r>
+            <a:r>
+              <a:rPr lang="pt-PT" sz="1200" b="0" i="0" kern="1200" dirty="0">
+                <a:solidFill>
+                  <a:schemeClr val="tx1"/>
+                </a:solidFill>
+                <a:effectLst/>
+                <a:latin typeface="+mn-lt"/>
+                <a:ea typeface="+mn-ea"/>
+                <a:cs typeface="+mn-cs"/>
+              </a:rPr>
+              <a:t> são uteis para prever o estado futuro com base nas características do estado presente. Assim , o programa utiliza e analisa as frases de um </a:t>
+            </a:r>
+            <a:r>
+              <a:rPr lang="pt-PT" sz="1200" b="0" i="0" kern="1200" dirty="0" err="1">
+                <a:solidFill>
+                  <a:schemeClr val="tx1"/>
+                </a:solidFill>
+                <a:effectLst/>
+                <a:latin typeface="+mn-lt"/>
+                <a:ea typeface="+mn-ea"/>
+                <a:cs typeface="+mn-cs"/>
+              </a:rPr>
+              <a:t>dataset</a:t>
+            </a:r>
+            <a:r>
+              <a:rPr lang="pt-PT" sz="1200" b="0" i="0" kern="1200" dirty="0">
+                <a:solidFill>
+                  <a:schemeClr val="tx1"/>
+                </a:solidFill>
+                <a:effectLst/>
+                <a:latin typeface="+mn-lt"/>
+                <a:ea typeface="+mn-ea"/>
+                <a:cs typeface="+mn-cs"/>
+              </a:rPr>
+              <a:t> inicial e, a partir dai, tenta prever e gerar novas frases. Utiliza as cadeiras de </a:t>
+            </a:r>
+            <a:r>
+              <a:rPr lang="pt-PT" sz="1200" b="0" i="0" kern="1200" dirty="0" err="1">
+                <a:solidFill>
+                  <a:schemeClr val="tx1"/>
+                </a:solidFill>
+                <a:effectLst/>
+                <a:latin typeface="+mn-lt"/>
+                <a:ea typeface="+mn-ea"/>
+                <a:cs typeface="+mn-cs"/>
+              </a:rPr>
+              <a:t>markov</a:t>
+            </a:r>
+            <a:r>
+              <a:rPr lang="pt-PT" sz="1200" b="0" i="0" kern="1200" dirty="0">
+                <a:solidFill>
+                  <a:schemeClr val="tx1"/>
+                </a:solidFill>
+                <a:effectLst/>
+                <a:latin typeface="+mn-lt"/>
+                <a:ea typeface="+mn-ea"/>
+                <a:cs typeface="+mn-cs"/>
+              </a:rPr>
+              <a:t> para prever quais as sequências de palavras mais adequadas que precedem a um outro conjunto de palavras.</a:t>
+            </a:r>
+          </a:p>
+          <a:p>
+            <a:pPr marL="171450" indent="-171450">
+              <a:buFontTx/>
+              <a:buChar char="-"/>
+            </a:pPr>
+            <a:r>
+              <a:rPr lang="pt-PT" sz="1200" b="0" i="0" kern="1200" dirty="0">
+                <a:solidFill>
+                  <a:schemeClr val="tx1"/>
+                </a:solidFill>
+                <a:effectLst/>
+                <a:latin typeface="+mn-lt"/>
+                <a:ea typeface="+mn-ea"/>
+                <a:cs typeface="+mn-cs"/>
+              </a:rPr>
+              <a:t>Cadeias de </a:t>
+            </a:r>
+            <a:r>
+              <a:rPr lang="pt-PT" sz="1200" b="0" i="0" kern="1200" dirty="0" err="1">
+                <a:solidFill>
+                  <a:schemeClr val="tx1"/>
+                </a:solidFill>
+                <a:effectLst/>
+                <a:latin typeface="+mn-lt"/>
+                <a:ea typeface="+mn-ea"/>
+                <a:cs typeface="+mn-cs"/>
+              </a:rPr>
+              <a:t>Markov</a:t>
+            </a:r>
+            <a:r>
+              <a:rPr lang="pt-PT" sz="1200" b="0" i="0" kern="1200" dirty="0">
+                <a:solidFill>
+                  <a:schemeClr val="tx1"/>
+                </a:solidFill>
+                <a:effectLst/>
+                <a:latin typeface="+mn-lt"/>
+                <a:ea typeface="+mn-ea"/>
+                <a:cs typeface="+mn-cs"/>
+              </a:rPr>
+              <a:t> são, por isso, bastante utilizadas neste tipo de situações (</a:t>
+            </a:r>
+            <a:r>
+              <a:rPr lang="pt-PT" sz="1200" b="0" i="0" kern="1200" dirty="0" err="1">
+                <a:solidFill>
+                  <a:schemeClr val="tx1"/>
+                </a:solidFill>
+                <a:effectLst/>
+                <a:latin typeface="+mn-lt"/>
+                <a:ea typeface="+mn-ea"/>
+                <a:cs typeface="+mn-cs"/>
+              </a:rPr>
+              <a:t>chatbots</a:t>
+            </a:r>
+            <a:r>
+              <a:rPr lang="pt-PT" sz="1200" b="0" i="0" kern="1200" dirty="0">
+                <a:solidFill>
+                  <a:schemeClr val="tx1"/>
+                </a:solidFill>
+                <a:effectLst/>
+                <a:latin typeface="+mn-lt"/>
+                <a:ea typeface="+mn-ea"/>
+                <a:cs typeface="+mn-cs"/>
+              </a:rPr>
+              <a:t>)!</a:t>
             </a:r>
           </a:p>
         </p:txBody>
@@ -2125,7 +2483,7 @@
           <a:p>
             <a:fld id="{F9C76EEC-3DB8-4814-A8C5-185DA6C5A9E9}" type="slidenum">
               <a:rPr lang="pt-PT" smtClean="0"/>
-              <a:t>10</a:t>
+              <a:t>9</a:t>
             </a:fld>
             <a:endParaRPr lang="pt-PT"/>
           </a:p>
@@ -2134,7 +2492,7 @@
     </p:spTree>
     <p:extLst>
       <p:ext uri="{BB962C8B-B14F-4D97-AF65-F5344CB8AC3E}">
-        <p14:creationId xmlns:p14="http://schemas.microsoft.com/office/powerpoint/2010/main" val="1631278"/>
+        <p14:creationId xmlns:p14="http://schemas.microsoft.com/office/powerpoint/2010/main" val="3154484066"/>
       </p:ext>
     </p:extLst>
   </p:cSld>
@@ -12476,10 +12834,10 @@
       </p:sp>
       <p:pic>
         <p:nvPicPr>
-          <p:cNvPr id="12" name="Marcador de Posição de Conteúdo 11">
+          <p:cNvPr id="11" name="Marcador de Posição de Conteúdo 10">
             <a:extLst>
               <a:ext uri="{FF2B5EF4-FFF2-40B4-BE49-F238E27FC236}">
-                <a16:creationId xmlns:a16="http://schemas.microsoft.com/office/drawing/2014/main" id="{F8809156-4AC9-4F2D-975F-C6112A3CBE11}"/>
+                <a16:creationId xmlns:a16="http://schemas.microsoft.com/office/drawing/2014/main" id="{298C9782-FAAF-48FA-8428-E1390A4F492E}"/>
               </a:ext>
             </a:extLst>
           </p:cNvPr>
@@ -12491,7 +12849,7 @@
           </p:nvPr>
         </p:nvPicPr>
         <p:blipFill>
-          <a:blip r:embed="rId2">
+          <a:blip r:embed="rId3">
             <a:extLst>
               <a:ext uri="{28A0092B-C50C-407E-A947-70E740481C1C}">
                 <a14:useLocalDpi xmlns:a14="http://schemas.microsoft.com/office/drawing/2010/main" val="0"/>
@@ -12504,8 +12862,8 @@
         </p:blipFill>
         <p:spPr>
           <a:xfrm>
-            <a:off x="5433376" y="432663"/>
-            <a:ext cx="5486365" cy="5872541"/>
+            <a:off x="5457010" y="548943"/>
+            <a:ext cx="5184320" cy="5549236"/>
           </a:xfrm>
         </p:spPr>
       </p:pic>
@@ -12962,19 +13320,20 @@
         </p:nvSpPr>
         <p:spPr>
           <a:xfrm>
-            <a:off x="940617" y="4421453"/>
-            <a:ext cx="865943" cy="369332"/>
+            <a:off x="811708" y="4282953"/>
+            <a:ext cx="1123761" cy="646331"/>
           </a:xfrm>
           <a:prstGeom prst="rect">
             <a:avLst/>
           </a:prstGeom>
         </p:spPr>
         <p:txBody>
-          <a:bodyPr wrap="none">
+          <a:bodyPr wrap="square">
             <a:spAutoFit/>
           </a:bodyPr>
           <a:lstStyle/>
           <a:p>
+            <a:pPr algn="ctr"/>
             <a:r>
               <a:rPr lang="pt-PT" i="1" dirty="0" err="1">
                 <a:solidFill>
@@ -12990,11 +13349,21 @@
               </a:rPr>
               <a:t>Profiler</a:t>
             </a:r>
-            <a:endParaRPr lang="pt-PT" dirty="0">
-              <a:solidFill>
-                <a:schemeClr val="bg1"/>
-              </a:solidFill>
-            </a:endParaRPr>
+            <a:r>
+              <a:rPr lang="pt-PT" i="1" dirty="0">
+                <a:solidFill>
+                  <a:schemeClr val="bg1"/>
+                </a:solidFill>
+                <a:effectLst>
+                  <a:outerShdw blurRad="38100" dist="38100" dir="2700000" algn="tl">
+                    <a:srgbClr val="000000">
+                      <a:alpha val="43137"/>
+                    </a:srgbClr>
+                  </a:outerShdw>
+                </a:effectLst>
+              </a:rPr>
+              <a:t>/ Manager</a:t>
+            </a:r>
           </a:p>
         </p:txBody>
       </p:sp>
@@ -14130,42 +14499,6 @@
           </a:p>
         </p:txBody>
       </p:sp>
-      <p:pic>
-        <p:nvPicPr>
-          <p:cNvPr id="11" name="Imagem 10" descr="Uma imagem com objeto&#10;&#10;Descrição gerada automaticamente">
-            <a:extLst>
-              <a:ext uri="{FF2B5EF4-FFF2-40B4-BE49-F238E27FC236}">
-                <a16:creationId xmlns:a16="http://schemas.microsoft.com/office/drawing/2014/main" id="{56C23E1A-3E18-429C-9802-D27661FD0B1C}"/>
-              </a:ext>
-            </a:extLst>
-          </p:cNvPr>
-          <p:cNvPicPr>
-            <a:picLocks noChangeAspect="1"/>
-          </p:cNvPicPr>
-          <p:nvPr/>
-        </p:nvPicPr>
-        <p:blipFill>
-          <a:blip r:embed="rId3">
-            <a:extLst>
-              <a:ext uri="{28A0092B-C50C-407E-A947-70E740481C1C}">
-                <a14:useLocalDpi xmlns:a14="http://schemas.microsoft.com/office/drawing/2010/main" val="0"/>
-              </a:ext>
-            </a:extLst>
-          </a:blip>
-          <a:stretch>
-            <a:fillRect/>
-          </a:stretch>
-        </p:blipFill>
-        <p:spPr>
-          <a:xfrm>
-            <a:off x="635458" y="1820226"/>
-            <a:ext cx="2484888" cy="1242444"/>
-          </a:xfrm>
-          <a:prstGeom prst="rect">
-            <a:avLst/>
-          </a:prstGeom>
-        </p:spPr>
-      </p:pic>
       <p:sp>
         <p:nvSpPr>
           <p:cNvPr id="79" name="Rectangle 78">
@@ -14241,7 +14574,7 @@
           <p:nvPr/>
         </p:nvPicPr>
         <p:blipFill>
-          <a:blip r:embed="rId4">
+          <a:blip r:embed="rId3">
             <a:extLst>
               <a:ext uri="{28A0092B-C50C-407E-A947-70E740481C1C}">
                 <a14:useLocalDpi xmlns:a14="http://schemas.microsoft.com/office/drawing/2010/main" val="0"/>
@@ -14347,7 +14680,7 @@
           <p:nvPr/>
         </p:nvPicPr>
         <p:blipFill>
-          <a:blip r:embed="rId5">
+          <a:blip r:embed="rId4">
             <a:extLst>
               <a:ext uri="{28A0092B-C50C-407E-A947-70E740481C1C}">
                 <a14:useLocalDpi xmlns:a14="http://schemas.microsoft.com/office/drawing/2010/main" val="0"/>
@@ -14443,7 +14776,7 @@
           <p:nvPr/>
         </p:nvPicPr>
         <p:blipFill>
-          <a:blip r:embed="rId6">
+          <a:blip r:embed="rId5">
             <a:extLst>
               <a:ext uri="{28A0092B-C50C-407E-A947-70E740481C1C}">
                 <a14:useLocalDpi xmlns:a14="http://schemas.microsoft.com/office/drawing/2010/main" val="0"/>
@@ -14627,6 +14960,81 @@
             <a:schemeClr val="lt1"/>
           </a:fontRef>
         </p:style>
+      </p:sp>
+      <p:pic>
+        <p:nvPicPr>
+          <p:cNvPr id="19" name="Imagem 18">
+            <a:extLst>
+              <a:ext uri="{FF2B5EF4-FFF2-40B4-BE49-F238E27FC236}">
+                <a16:creationId xmlns:a16="http://schemas.microsoft.com/office/drawing/2014/main" id="{3B0BA9C1-751F-45A8-957E-97A161D134A0}"/>
+              </a:ext>
+            </a:extLst>
+          </p:cNvPr>
+          <p:cNvPicPr>
+            <a:picLocks noChangeAspect="1"/>
+          </p:cNvPicPr>
+          <p:nvPr/>
+        </p:nvPicPr>
+        <p:blipFill>
+          <a:blip r:embed="rId6"/>
+          <a:stretch>
+            <a:fillRect/>
+          </a:stretch>
+        </p:blipFill>
+        <p:spPr>
+          <a:xfrm>
+            <a:off x="420030" y="1405901"/>
+            <a:ext cx="2700316" cy="924688"/>
+          </a:xfrm>
+          <a:prstGeom prst="rect">
+            <a:avLst/>
+          </a:prstGeom>
+        </p:spPr>
+      </p:pic>
+      <p:sp>
+        <p:nvSpPr>
+          <p:cNvPr id="6" name="CaixaDeTexto 5">
+            <a:extLst>
+              <a:ext uri="{FF2B5EF4-FFF2-40B4-BE49-F238E27FC236}">
+                <a16:creationId xmlns:a16="http://schemas.microsoft.com/office/drawing/2014/main" id="{68603E96-BD16-4A17-906A-F7D2230A3880}"/>
+              </a:ext>
+            </a:extLst>
+          </p:cNvPr>
+          <p:cNvSpPr txBox="1"/>
+          <p:nvPr/>
+        </p:nvSpPr>
+        <p:spPr>
+          <a:xfrm>
+            <a:off x="420030" y="2470912"/>
+            <a:ext cx="2693814" cy="646331"/>
+          </a:xfrm>
+          <a:prstGeom prst="rect">
+            <a:avLst/>
+          </a:prstGeom>
+          <a:noFill/>
+        </p:spPr>
+        <p:txBody>
+          <a:bodyPr wrap="none" rtlCol="0">
+            <a:spAutoFit/>
+          </a:bodyPr>
+          <a:lstStyle/>
+          <a:p>
+            <a:pPr algn="ctr"/>
+            <a:r>
+              <a:rPr lang="en-US" b="1" dirty="0" err="1"/>
+              <a:t>PyKnow</a:t>
+            </a:r>
+            <a:endParaRPr lang="en-US" b="1" dirty="0"/>
+          </a:p>
+          <a:p>
+            <a:pPr algn="ctr"/>
+            <a:r>
+              <a:rPr lang="en-US" dirty="0"/>
+              <a:t> Expert Systems for Python</a:t>
+            </a:r>
+            <a:endParaRPr lang="pt-PT" dirty="0"/>
+          </a:p>
+        </p:txBody>
       </p:sp>
     </p:spTree>
     <p:extLst>

</xml_diff>